<commit_message>
Updated HW6 and added some more notes
</commit_message>
<xml_diff>
--- a/notes/Week8-career-trajectories.pptx
+++ b/notes/Week8-career-trajectories.pptx
@@ -5,23 +5,24 @@
     <p:sldMasterId id="2147483660" r:id="rId1"/>
   </p:sldMasterIdLst>
   <p:notesMasterIdLst>
-    <p:notesMasterId r:id="rId13"/>
+    <p:notesMasterId r:id="rId14"/>
   </p:notesMasterIdLst>
   <p:handoutMasterIdLst>
-    <p:handoutMasterId r:id="rId14"/>
+    <p:handoutMasterId r:id="rId15"/>
   </p:handoutMasterIdLst>
   <p:sldIdLst>
     <p:sldId id="264" r:id="rId2"/>
-    <p:sldId id="265" r:id="rId3"/>
-    <p:sldId id="269" r:id="rId4"/>
-    <p:sldId id="268" r:id="rId5"/>
-    <p:sldId id="266" r:id="rId6"/>
-    <p:sldId id="273" r:id="rId7"/>
-    <p:sldId id="274" r:id="rId8"/>
-    <p:sldId id="275" r:id="rId9"/>
-    <p:sldId id="277" r:id="rId10"/>
-    <p:sldId id="272" r:id="rId11"/>
-    <p:sldId id="267" r:id="rId12"/>
+    <p:sldId id="278" r:id="rId3"/>
+    <p:sldId id="265" r:id="rId4"/>
+    <p:sldId id="269" r:id="rId5"/>
+    <p:sldId id="268" r:id="rId6"/>
+    <p:sldId id="266" r:id="rId7"/>
+    <p:sldId id="273" r:id="rId8"/>
+    <p:sldId id="274" r:id="rId9"/>
+    <p:sldId id="275" r:id="rId10"/>
+    <p:sldId id="277" r:id="rId11"/>
+    <p:sldId id="272" r:id="rId12"/>
+    <p:sldId id="267" r:id="rId13"/>
   </p:sldIdLst>
   <p:sldSz cx="12161838" cy="6858000"/>
   <p:notesSz cx="7023100" cy="9309100"/>
@@ -240,7 +241,7 @@
           <a:p>
             <a:fld id="{C94BF1D3-5036-4D1A-A3B2-025E6980F662}" type="datetimeFigureOut">
               <a:rPr lang="en-US" smtClean="0"/>
-              <a:t>10/20/2020</a:t>
+              <a:t>11/3/2020</a:t>
             </a:fld>
             <a:endParaRPr lang="en-US"/>
           </a:p>
@@ -405,7 +406,7 @@
           <a:p>
             <a:fld id="{FD852303-BCF1-4F7F-83D3-C9EE5BF074C9}" type="datetimeFigureOut">
               <a:rPr lang="en-US" smtClean="0"/>
-              <a:t>10/20/2020</a:t>
+              <a:t>11/3/2020</a:t>
             </a:fld>
             <a:endParaRPr lang="en-US"/>
           </a:p>
@@ -4696,7 +4697,7 @@
           <p:cNvPr id="2" name="Title 1">
             <a:extLst>
               <a:ext uri="{FF2B5EF4-FFF2-40B4-BE49-F238E27FC236}">
-                <a16:creationId xmlns:a16="http://schemas.microsoft.com/office/drawing/2014/main" id="{D8A0983C-0074-4CEC-80D3-C0A7B7F61EF2}"/>
+                <a16:creationId xmlns:a16="http://schemas.microsoft.com/office/drawing/2014/main" id="{B3FA069B-AE7F-46E3-BEED-936DCD49D8F3}"/>
               </a:ext>
             </a:extLst>
           </p:cNvPr>
@@ -4714,7 +4715,7 @@
           <a:p>
             <a:r>
               <a:rPr lang="en-US" dirty="0"/>
-              <a:t>Management</a:t>
+              <a:t>Data Scientist</a:t>
             </a:r>
           </a:p>
         </p:txBody>
@@ -4724,7 +4725,7 @@
           <p:cNvPr id="3" name="Text Placeholder 2">
             <a:extLst>
               <a:ext uri="{FF2B5EF4-FFF2-40B4-BE49-F238E27FC236}">
-                <a16:creationId xmlns:a16="http://schemas.microsoft.com/office/drawing/2014/main" id="{077751D2-1218-4BFE-B3B6-5C1A2506084A}"/>
+                <a16:creationId xmlns:a16="http://schemas.microsoft.com/office/drawing/2014/main" id="{63DCDD34-CD91-48D5-A20F-8D7866D48B7B}"/>
               </a:ext>
             </a:extLst>
           </p:cNvPr>
@@ -4742,51 +4743,70 @@
           <a:p>
             <a:r>
               <a:rPr lang="en-US" dirty="0"/>
-              <a:t>SW companies often promote developers to management</a:t>
+              <a:t>Responsible for managing and analyzing data</a:t>
             </a:r>
           </a:p>
           <a:p>
             <a:pPr lvl="1"/>
             <a:r>
               <a:rPr lang="en-US" dirty="0"/>
-              <a:t>Understand how SW works better than non-technical people</a:t>
-            </a:r>
-          </a:p>
-          <a:p>
-            <a:r>
-              <a:rPr lang="en-US" dirty="0"/>
-              <a:t>Usually required to get a Masters of Business Administration (MBA)</a:t>
-            </a:r>
-          </a:p>
-          <a:p>
-            <a:r>
-              <a:rPr lang="en-US" dirty="0"/>
-              <a:t>Management responsibilities will cut into development time</a:t>
+              <a:t>Often given data from others, but may also collect it themselves</a:t>
             </a:r>
           </a:p>
           <a:p>
             <a:pPr lvl="1"/>
             <a:r>
               <a:rPr lang="en-US" dirty="0"/>
-              <a:t>Some do no coding and are full-time managers</a:t>
+              <a:t>Take the data and learn something useful from it</a:t>
+            </a:r>
+          </a:p>
+          <a:p>
+            <a:r>
+              <a:rPr lang="en-US" dirty="0"/>
+              <a:t>Courses you should take</a:t>
             </a:r>
           </a:p>
           <a:p>
             <a:pPr lvl="1"/>
             <a:r>
               <a:rPr lang="en-US" dirty="0"/>
-              <a:t>Others do part-time management, part-time development</a:t>
+              <a:t>Data Mining (COMP 4210)</a:t>
             </a:r>
           </a:p>
           <a:p>
             <a:pPr lvl="1"/>
             <a:r>
               <a:rPr lang="en-US" dirty="0"/>
-              <a:t>Depends on company and project</a:t>
-            </a:r>
-          </a:p>
-          <a:p>
-            <a:endParaRPr lang="en-US" dirty="0"/>
+              <a:t>Machine Learning (COMP 4220)</a:t>
+            </a:r>
+          </a:p>
+          <a:p>
+            <a:pPr lvl="1"/>
+            <a:r>
+              <a:rPr lang="en-US" dirty="0"/>
+              <a:t>Database (COMP 3090)</a:t>
+            </a:r>
+          </a:p>
+          <a:p>
+            <a:pPr lvl="1"/>
+            <a:r>
+              <a:rPr lang="en-US" dirty="0"/>
+              <a:t>Bioinformatics for CS (COMP 4290)</a:t>
+            </a:r>
+          </a:p>
+          <a:p>
+            <a:pPr lvl="1"/>
+            <a:r>
+              <a:rPr lang="en-US" dirty="0"/>
+              <a:t>More statistics</a:t>
+            </a:r>
+          </a:p>
+          <a:p>
+            <a:pPr lvl="1"/>
+            <a:r>
+              <a:rPr lang="en-US" dirty="0"/>
+              <a:t>Good idea to pair with another science</a:t>
+            </a:r>
           </a:p>
         </p:txBody>
       </p:sp>
@@ -4795,7 +4815,7 @@
           <p:cNvPr id="4" name="Slide Number Placeholder 3">
             <a:extLst>
               <a:ext uri="{FF2B5EF4-FFF2-40B4-BE49-F238E27FC236}">
-                <a16:creationId xmlns:a16="http://schemas.microsoft.com/office/drawing/2014/main" id="{372DA817-19FA-4897-8413-0F40CB029EC4}"/>
+                <a16:creationId xmlns:a16="http://schemas.microsoft.com/office/drawing/2014/main" id="{80D3A6D5-BCD4-4BA2-8753-0CD809CC20E1}"/>
               </a:ext>
             </a:extLst>
           </p:cNvPr>
@@ -4823,7 +4843,7 @@
     </p:spTree>
     <p:extLst>
       <p:ext uri="{BB962C8B-B14F-4D97-AF65-F5344CB8AC3E}">
-        <p14:creationId xmlns:p14="http://schemas.microsoft.com/office/powerpoint/2010/main" val="4260319869"/>
+        <p14:creationId xmlns:p14="http://schemas.microsoft.com/office/powerpoint/2010/main" val="3473724036"/>
       </p:ext>
     </p:extLst>
   </p:cSld>
@@ -4855,6 +4875,165 @@
           <p:cNvPr id="2" name="Title 1">
             <a:extLst>
               <a:ext uri="{FF2B5EF4-FFF2-40B4-BE49-F238E27FC236}">
+                <a16:creationId xmlns:a16="http://schemas.microsoft.com/office/drawing/2014/main" id="{D8A0983C-0074-4CEC-80D3-C0A7B7F61EF2}"/>
+              </a:ext>
+            </a:extLst>
+          </p:cNvPr>
+          <p:cNvSpPr>
+            <a:spLocks noGrp="1"/>
+          </p:cNvSpPr>
+          <p:nvPr>
+            <p:ph type="title"/>
+          </p:nvPr>
+        </p:nvSpPr>
+        <p:spPr/>
+        <p:txBody>
+          <a:bodyPr/>
+          <a:lstStyle/>
+          <a:p>
+            <a:r>
+              <a:rPr lang="en-US" dirty="0"/>
+              <a:t>Management</a:t>
+            </a:r>
+          </a:p>
+        </p:txBody>
+      </p:sp>
+      <p:sp>
+        <p:nvSpPr>
+          <p:cNvPr id="3" name="Text Placeholder 2">
+            <a:extLst>
+              <a:ext uri="{FF2B5EF4-FFF2-40B4-BE49-F238E27FC236}">
+                <a16:creationId xmlns:a16="http://schemas.microsoft.com/office/drawing/2014/main" id="{077751D2-1218-4BFE-B3B6-5C1A2506084A}"/>
+              </a:ext>
+            </a:extLst>
+          </p:cNvPr>
+          <p:cNvSpPr>
+            <a:spLocks noGrp="1"/>
+          </p:cNvSpPr>
+          <p:nvPr>
+            <p:ph type="body" sz="quarter" idx="11"/>
+          </p:nvPr>
+        </p:nvSpPr>
+        <p:spPr/>
+        <p:txBody>
+          <a:bodyPr/>
+          <a:lstStyle/>
+          <a:p>
+            <a:r>
+              <a:rPr lang="en-US" dirty="0"/>
+              <a:t>SW companies often promote developers to management</a:t>
+            </a:r>
+          </a:p>
+          <a:p>
+            <a:pPr lvl="1"/>
+            <a:r>
+              <a:rPr lang="en-US" dirty="0"/>
+              <a:t>Understand how SW works better than non-technical people</a:t>
+            </a:r>
+          </a:p>
+          <a:p>
+            <a:r>
+              <a:rPr lang="en-US" dirty="0"/>
+              <a:t>Usually required to get a Masters of Business Administration (MBA)</a:t>
+            </a:r>
+          </a:p>
+          <a:p>
+            <a:r>
+              <a:rPr lang="en-US" dirty="0"/>
+              <a:t>Management responsibilities will cut into development time</a:t>
+            </a:r>
+          </a:p>
+          <a:p>
+            <a:pPr lvl="1"/>
+            <a:r>
+              <a:rPr lang="en-US" dirty="0"/>
+              <a:t>Some do no coding and are full-time managers</a:t>
+            </a:r>
+          </a:p>
+          <a:p>
+            <a:pPr lvl="1"/>
+            <a:r>
+              <a:rPr lang="en-US" dirty="0"/>
+              <a:t>Others do part-time management, part-time development</a:t>
+            </a:r>
+          </a:p>
+          <a:p>
+            <a:pPr lvl="1"/>
+            <a:r>
+              <a:rPr lang="en-US" dirty="0"/>
+              <a:t>Depends on company and project</a:t>
+            </a:r>
+          </a:p>
+          <a:p>
+            <a:endParaRPr lang="en-US" dirty="0"/>
+          </a:p>
+        </p:txBody>
+      </p:sp>
+      <p:sp>
+        <p:nvSpPr>
+          <p:cNvPr id="4" name="Slide Number Placeholder 3">
+            <a:extLst>
+              <a:ext uri="{FF2B5EF4-FFF2-40B4-BE49-F238E27FC236}">
+                <a16:creationId xmlns:a16="http://schemas.microsoft.com/office/drawing/2014/main" id="{372DA817-19FA-4897-8413-0F40CB029EC4}"/>
+              </a:ext>
+            </a:extLst>
+          </p:cNvPr>
+          <p:cNvSpPr>
+            <a:spLocks noGrp="1"/>
+          </p:cNvSpPr>
+          <p:nvPr>
+            <p:ph type="sldNum" sz="quarter" idx="12"/>
+          </p:nvPr>
+        </p:nvSpPr>
+        <p:spPr/>
+        <p:txBody>
+          <a:bodyPr/>
+          <a:lstStyle/>
+          <a:p>
+            <a:fld id="{0FA920F7-7227-4D6E-B7C6-AC05743CC8F3}" type="slidenum">
+              <a:rPr lang="en-US" smtClean="0"/>
+              <a:pPr/>
+              <a:t>11</a:t>
+            </a:fld>
+            <a:endParaRPr lang="en-US" dirty="0"/>
+          </a:p>
+        </p:txBody>
+      </p:sp>
+    </p:spTree>
+    <p:extLst>
+      <p:ext uri="{BB962C8B-B14F-4D97-AF65-F5344CB8AC3E}">
+        <p14:creationId xmlns:p14="http://schemas.microsoft.com/office/powerpoint/2010/main" val="4260319869"/>
+      </p:ext>
+    </p:extLst>
+  </p:cSld>
+  <p:clrMapOvr>
+    <a:masterClrMapping/>
+  </p:clrMapOvr>
+</p:sld>
+</file>
+
+<file path=ppt/slides/slide12.xml><?xml version="1.0" encoding="utf-8"?>
+<p:sld xmlns:a="http://schemas.openxmlformats.org/drawingml/2006/main" xmlns:r="http://schemas.openxmlformats.org/officeDocument/2006/relationships" xmlns:p="http://schemas.openxmlformats.org/presentationml/2006/main">
+  <p:cSld>
+    <p:spTree>
+      <p:nvGrpSpPr>
+        <p:cNvPr id="1" name=""/>
+        <p:cNvGrpSpPr/>
+        <p:nvPr/>
+      </p:nvGrpSpPr>
+      <p:grpSpPr>
+        <a:xfrm>
+          <a:off x="0" y="0"/>
+          <a:ext cx="0" cy="0"/>
+          <a:chOff x="0" y="0"/>
+          <a:chExt cx="0" cy="0"/>
+        </a:xfrm>
+      </p:grpSpPr>
+      <p:sp>
+        <p:nvSpPr>
+          <p:cNvPr id="2" name="Title 1">
+            <a:extLst>
+              <a:ext uri="{FF2B5EF4-FFF2-40B4-BE49-F238E27FC236}">
                 <a16:creationId xmlns:a16="http://schemas.microsoft.com/office/drawing/2014/main" id="{6F725BC1-DCC4-4BF8-85F2-4C8B3F911148}"/>
               </a:ext>
             </a:extLst>
@@ -4961,7 +5140,7 @@
             <a:fld id="{0FA920F7-7227-4D6E-B7C6-AC05743CC8F3}" type="slidenum">
               <a:rPr lang="en-US" smtClean="0"/>
               <a:pPr/>
-              <a:t>11</a:t>
+              <a:t>12</a:t>
             </a:fld>
             <a:endParaRPr lang="en-US" dirty="0"/>
           </a:p>
@@ -5002,7 +5181,7 @@
           <p:cNvPr id="5" name="Title 4">
             <a:extLst>
               <a:ext uri="{FF2B5EF4-FFF2-40B4-BE49-F238E27FC236}">
-                <a16:creationId xmlns:a16="http://schemas.microsoft.com/office/drawing/2014/main" id="{E0655BF5-8C0F-4C6F-8D8C-5AB2C1C7F402}"/>
+                <a16:creationId xmlns:a16="http://schemas.microsoft.com/office/drawing/2014/main" id="{D80BB593-C8DF-4032-AB4F-6CB64176B099}"/>
               </a:ext>
             </a:extLst>
           </p:cNvPr>
@@ -5020,7 +5199,7 @@
           <a:p>
             <a:r>
               <a:rPr lang="en-US" dirty="0"/>
-              <a:t>Careers</a:t>
+              <a:t>Announcements</a:t>
             </a:r>
           </a:p>
         </p:txBody>
@@ -5030,7 +5209,7 @@
           <p:cNvPr id="6" name="Text Placeholder 5">
             <a:extLst>
               <a:ext uri="{FF2B5EF4-FFF2-40B4-BE49-F238E27FC236}">
-                <a16:creationId xmlns:a16="http://schemas.microsoft.com/office/drawing/2014/main" id="{0FC4BA0C-922B-440C-AE05-DFFB715544A7}"/>
+                <a16:creationId xmlns:a16="http://schemas.microsoft.com/office/drawing/2014/main" id="{DE478441-72DD-4493-A5AA-EDF5058CB6D0}"/>
               </a:ext>
             </a:extLst>
           </p:cNvPr>
@@ -5048,71 +5227,35 @@
           <a:p>
             <a:r>
               <a:rPr lang="en-US" dirty="0"/>
-              <a:t>Handshake</a:t>
-            </a:r>
-          </a:p>
-          <a:p>
-            <a:r>
-              <a:rPr lang="en-US" dirty="0"/>
-              <a:t>LinkedIn</a:t>
-            </a:r>
-          </a:p>
-          <a:p>
-            <a:r>
-              <a:rPr lang="en-US" dirty="0"/>
-              <a:t>Internships</a:t>
-            </a:r>
-          </a:p>
-          <a:p>
-            <a:r>
-              <a:rPr lang="en-US" dirty="0"/>
-              <a:t>Possible Jobs</a:t>
+              <a:t>Today is election day</a:t>
             </a:r>
           </a:p>
           <a:p>
             <a:pPr lvl="1"/>
             <a:r>
               <a:rPr lang="en-US" dirty="0"/>
-              <a:t>Software Developer</a:t>
+              <a:t>Go out and vote if you haven’t already</a:t>
+            </a:r>
+          </a:p>
+          <a:p>
+            <a:r>
+              <a:rPr lang="en-US" dirty="0"/>
+              <a:t>No class next week</a:t>
             </a:r>
           </a:p>
           <a:p>
             <a:pPr lvl="1"/>
             <a:r>
               <a:rPr lang="en-US" dirty="0"/>
-              <a:t>Cybersecurity Expert</a:t>
+              <a:t>Nov 10 is a designated Monday</a:t>
             </a:r>
           </a:p>
           <a:p>
             <a:pPr lvl="1"/>
             <a:r>
               <a:rPr lang="en-US" dirty="0"/>
-              <a:t>UX Designer</a:t>
-            </a:r>
-          </a:p>
-          <a:p>
-            <a:pPr lvl="1"/>
-            <a:r>
-              <a:rPr lang="en-US" dirty="0"/>
-              <a:t>DB Administrator</a:t>
-            </a:r>
-          </a:p>
-          <a:p>
-            <a:pPr lvl="1"/>
-            <a:r>
-              <a:rPr lang="en-US" dirty="0"/>
-              <a:t>Data Scientist</a:t>
-            </a:r>
-          </a:p>
-          <a:p>
-            <a:pPr lvl="1"/>
-            <a:r>
-              <a:rPr lang="en-US" dirty="0"/>
-              <a:t>Management</a:t>
-            </a:r>
-          </a:p>
-          <a:p>
-            <a:endParaRPr lang="en-US" dirty="0"/>
+              <a:t>Nov 11 is Veteran’s Day</a:t>
+            </a:r>
           </a:p>
         </p:txBody>
       </p:sp>
@@ -5121,7 +5264,7 @@
           <p:cNvPr id="4" name="Slide Number Placeholder 3">
             <a:extLst>
               <a:ext uri="{FF2B5EF4-FFF2-40B4-BE49-F238E27FC236}">
-                <a16:creationId xmlns:a16="http://schemas.microsoft.com/office/drawing/2014/main" id="{8818E367-0BA9-491A-A9D4-8912CDE8C50A}"/>
+                <a16:creationId xmlns:a16="http://schemas.microsoft.com/office/drawing/2014/main" id="{0BCA5DC2-484C-4C6B-871D-9BB80C74CE5B}"/>
               </a:ext>
             </a:extLst>
           </p:cNvPr>
@@ -5149,7 +5292,7 @@
     </p:spTree>
     <p:extLst>
       <p:ext uri="{BB962C8B-B14F-4D97-AF65-F5344CB8AC3E}">
-        <p14:creationId xmlns:p14="http://schemas.microsoft.com/office/powerpoint/2010/main" val="259821854"/>
+        <p14:creationId xmlns:p14="http://schemas.microsoft.com/office/powerpoint/2010/main" val="1599154610"/>
       </p:ext>
     </p:extLst>
   </p:cSld>
@@ -5178,6 +5321,185 @@
       </p:grpSpPr>
       <p:sp>
         <p:nvSpPr>
+          <p:cNvPr id="5" name="Title 4">
+            <a:extLst>
+              <a:ext uri="{FF2B5EF4-FFF2-40B4-BE49-F238E27FC236}">
+                <a16:creationId xmlns:a16="http://schemas.microsoft.com/office/drawing/2014/main" id="{E0655BF5-8C0F-4C6F-8D8C-5AB2C1C7F402}"/>
+              </a:ext>
+            </a:extLst>
+          </p:cNvPr>
+          <p:cNvSpPr>
+            <a:spLocks noGrp="1"/>
+          </p:cNvSpPr>
+          <p:nvPr>
+            <p:ph type="title"/>
+          </p:nvPr>
+        </p:nvSpPr>
+        <p:spPr/>
+        <p:txBody>
+          <a:bodyPr/>
+          <a:lstStyle/>
+          <a:p>
+            <a:r>
+              <a:rPr lang="en-US" dirty="0"/>
+              <a:t>Careers</a:t>
+            </a:r>
+          </a:p>
+        </p:txBody>
+      </p:sp>
+      <p:sp>
+        <p:nvSpPr>
+          <p:cNvPr id="6" name="Text Placeholder 5">
+            <a:extLst>
+              <a:ext uri="{FF2B5EF4-FFF2-40B4-BE49-F238E27FC236}">
+                <a16:creationId xmlns:a16="http://schemas.microsoft.com/office/drawing/2014/main" id="{0FC4BA0C-922B-440C-AE05-DFFB715544A7}"/>
+              </a:ext>
+            </a:extLst>
+          </p:cNvPr>
+          <p:cNvSpPr>
+            <a:spLocks noGrp="1"/>
+          </p:cNvSpPr>
+          <p:nvPr>
+            <p:ph type="body" sz="quarter" idx="11"/>
+          </p:nvPr>
+        </p:nvSpPr>
+        <p:spPr/>
+        <p:txBody>
+          <a:bodyPr/>
+          <a:lstStyle/>
+          <a:p>
+            <a:r>
+              <a:rPr lang="en-US" dirty="0"/>
+              <a:t>Handshake</a:t>
+            </a:r>
+          </a:p>
+          <a:p>
+            <a:r>
+              <a:rPr lang="en-US" dirty="0"/>
+              <a:t>LinkedIn</a:t>
+            </a:r>
+          </a:p>
+          <a:p>
+            <a:r>
+              <a:rPr lang="en-US" dirty="0"/>
+              <a:t>Internships</a:t>
+            </a:r>
+          </a:p>
+          <a:p>
+            <a:r>
+              <a:rPr lang="en-US" dirty="0"/>
+              <a:t>Possible Jobs</a:t>
+            </a:r>
+          </a:p>
+          <a:p>
+            <a:pPr lvl="1"/>
+            <a:r>
+              <a:rPr lang="en-US" dirty="0"/>
+              <a:t>Software Developer</a:t>
+            </a:r>
+          </a:p>
+          <a:p>
+            <a:pPr lvl="1"/>
+            <a:r>
+              <a:rPr lang="en-US" dirty="0"/>
+              <a:t>Cybersecurity Expert</a:t>
+            </a:r>
+          </a:p>
+          <a:p>
+            <a:pPr lvl="1"/>
+            <a:r>
+              <a:rPr lang="en-US" dirty="0"/>
+              <a:t>UX Designer</a:t>
+            </a:r>
+          </a:p>
+          <a:p>
+            <a:pPr lvl="1"/>
+            <a:r>
+              <a:rPr lang="en-US" dirty="0"/>
+              <a:t>DB Administrator</a:t>
+            </a:r>
+          </a:p>
+          <a:p>
+            <a:pPr lvl="1"/>
+            <a:r>
+              <a:rPr lang="en-US" dirty="0"/>
+              <a:t>Data Scientist</a:t>
+            </a:r>
+          </a:p>
+          <a:p>
+            <a:pPr lvl="1"/>
+            <a:r>
+              <a:rPr lang="en-US" dirty="0"/>
+              <a:t>Management</a:t>
+            </a:r>
+          </a:p>
+          <a:p>
+            <a:endParaRPr lang="en-US" dirty="0"/>
+          </a:p>
+        </p:txBody>
+      </p:sp>
+      <p:sp>
+        <p:nvSpPr>
+          <p:cNvPr id="4" name="Slide Number Placeholder 3">
+            <a:extLst>
+              <a:ext uri="{FF2B5EF4-FFF2-40B4-BE49-F238E27FC236}">
+                <a16:creationId xmlns:a16="http://schemas.microsoft.com/office/drawing/2014/main" id="{8818E367-0BA9-491A-A9D4-8912CDE8C50A}"/>
+              </a:ext>
+            </a:extLst>
+          </p:cNvPr>
+          <p:cNvSpPr>
+            <a:spLocks noGrp="1"/>
+          </p:cNvSpPr>
+          <p:nvPr>
+            <p:ph type="sldNum" sz="quarter" idx="12"/>
+          </p:nvPr>
+        </p:nvSpPr>
+        <p:spPr/>
+        <p:txBody>
+          <a:bodyPr/>
+          <a:lstStyle/>
+          <a:p>
+            <a:fld id="{0FA920F7-7227-4D6E-B7C6-AC05743CC8F3}" type="slidenum">
+              <a:rPr lang="en-US" smtClean="0"/>
+              <a:pPr/>
+              <a:t>3</a:t>
+            </a:fld>
+            <a:endParaRPr lang="en-US" dirty="0"/>
+          </a:p>
+        </p:txBody>
+      </p:sp>
+    </p:spTree>
+    <p:extLst>
+      <p:ext uri="{BB962C8B-B14F-4D97-AF65-F5344CB8AC3E}">
+        <p14:creationId xmlns:p14="http://schemas.microsoft.com/office/powerpoint/2010/main" val="259821854"/>
+      </p:ext>
+    </p:extLst>
+  </p:cSld>
+  <p:clrMapOvr>
+    <a:masterClrMapping/>
+  </p:clrMapOvr>
+</p:sld>
+</file>
+
+<file path=ppt/slides/slide4.xml><?xml version="1.0" encoding="utf-8"?>
+<p:sld xmlns:a="http://schemas.openxmlformats.org/drawingml/2006/main" xmlns:r="http://schemas.openxmlformats.org/officeDocument/2006/relationships" xmlns:p="http://schemas.openxmlformats.org/presentationml/2006/main">
+  <p:cSld>
+    <p:spTree>
+      <p:nvGrpSpPr>
+        <p:cNvPr id="1" name=""/>
+        <p:cNvGrpSpPr/>
+        <p:nvPr/>
+      </p:nvGrpSpPr>
+      <p:grpSpPr>
+        <a:xfrm>
+          <a:off x="0" y="0"/>
+          <a:ext cx="0" cy="0"/>
+          <a:chOff x="0" y="0"/>
+          <a:chExt cx="0" cy="0"/>
+        </a:xfrm>
+      </p:grpSpPr>
+      <p:sp>
+        <p:nvSpPr>
           <p:cNvPr id="2" name="Title 1">
             <a:extLst>
               <a:ext uri="{FF2B5EF4-FFF2-40B4-BE49-F238E27FC236}">
@@ -5334,7 +5656,7 @@
             <a:fld id="{0FA920F7-7227-4D6E-B7C6-AC05743CC8F3}" type="slidenum">
               <a:rPr lang="en-US" smtClean="0"/>
               <a:pPr/>
-              <a:t>3</a:t>
+              <a:t>4</a:t>
             </a:fld>
             <a:endParaRPr lang="en-US" dirty="0"/>
           </a:p>
@@ -5389,7 +5711,7 @@
 </p:sld>
 </file>
 
-<file path=ppt/slides/slide4.xml><?xml version="1.0" encoding="utf-8"?>
+<file path=ppt/slides/slide5.xml><?xml version="1.0" encoding="utf-8"?>
 <p:sld xmlns:a="http://schemas.openxmlformats.org/drawingml/2006/main" xmlns:r="http://schemas.openxmlformats.org/officeDocument/2006/relationships" xmlns:p="http://schemas.openxmlformats.org/presentationml/2006/main">
   <p:cSld>
     <p:spTree>
@@ -5530,7 +5852,7 @@
             <a:fld id="{0FA920F7-7227-4D6E-B7C6-AC05743CC8F3}" type="slidenum">
               <a:rPr lang="en-US" smtClean="0"/>
               <a:pPr/>
-              <a:t>4</a:t>
+              <a:t>5</a:t>
             </a:fld>
             <a:endParaRPr lang="en-US" dirty="0"/>
           </a:p>
@@ -5585,183 +5907,6 @@
 </p:sld>
 </file>
 
-<file path=ppt/slides/slide5.xml><?xml version="1.0" encoding="utf-8"?>
-<p:sld xmlns:a="http://schemas.openxmlformats.org/drawingml/2006/main" xmlns:r="http://schemas.openxmlformats.org/officeDocument/2006/relationships" xmlns:p="http://schemas.openxmlformats.org/presentationml/2006/main">
-  <p:cSld>
-    <p:spTree>
-      <p:nvGrpSpPr>
-        <p:cNvPr id="1" name=""/>
-        <p:cNvGrpSpPr/>
-        <p:nvPr/>
-      </p:nvGrpSpPr>
-      <p:grpSpPr>
-        <a:xfrm>
-          <a:off x="0" y="0"/>
-          <a:ext cx="0" cy="0"/>
-          <a:chOff x="0" y="0"/>
-          <a:chExt cx="0" cy="0"/>
-        </a:xfrm>
-      </p:grpSpPr>
-      <p:sp>
-        <p:nvSpPr>
-          <p:cNvPr id="2" name="Title 1">
-            <a:extLst>
-              <a:ext uri="{FF2B5EF4-FFF2-40B4-BE49-F238E27FC236}">
-                <a16:creationId xmlns:a16="http://schemas.microsoft.com/office/drawing/2014/main" id="{E0DEFF18-690D-495A-9873-45141E4AFF75}"/>
-              </a:ext>
-            </a:extLst>
-          </p:cNvPr>
-          <p:cNvSpPr>
-            <a:spLocks noGrp="1"/>
-          </p:cNvSpPr>
-          <p:nvPr>
-            <p:ph type="title"/>
-          </p:nvPr>
-        </p:nvSpPr>
-        <p:spPr/>
-        <p:txBody>
-          <a:bodyPr/>
-          <a:lstStyle/>
-          <a:p>
-            <a:r>
-              <a:rPr lang="en-US" dirty="0"/>
-              <a:t>Internship</a:t>
-            </a:r>
-          </a:p>
-        </p:txBody>
-      </p:sp>
-      <p:sp>
-        <p:nvSpPr>
-          <p:cNvPr id="3" name="Text Placeholder 2">
-            <a:extLst>
-              <a:ext uri="{FF2B5EF4-FFF2-40B4-BE49-F238E27FC236}">
-                <a16:creationId xmlns:a16="http://schemas.microsoft.com/office/drawing/2014/main" id="{C377CD3B-BF6D-48BD-89D9-7004166B1028}"/>
-              </a:ext>
-            </a:extLst>
-          </p:cNvPr>
-          <p:cNvSpPr>
-            <a:spLocks noGrp="1"/>
-          </p:cNvSpPr>
-          <p:nvPr>
-            <p:ph type="body" sz="quarter" idx="11"/>
-          </p:nvPr>
-        </p:nvSpPr>
-        <p:spPr/>
-        <p:txBody>
-          <a:bodyPr/>
-          <a:lstStyle/>
-          <a:p>
-            <a:r>
-              <a:rPr lang="en-US" dirty="0"/>
-              <a:t>Temporary job where you learn through real-world experience</a:t>
-            </a:r>
-          </a:p>
-          <a:p>
-            <a:pPr lvl="1"/>
-            <a:r>
-              <a:rPr lang="en-US" dirty="0"/>
-              <a:t>Often for ~10-12 weeks over the summer</a:t>
-            </a:r>
-          </a:p>
-          <a:p>
-            <a:pPr lvl="1"/>
-            <a:r>
-              <a:rPr lang="en-US" dirty="0"/>
-              <a:t>Sometimes have internships during the school year</a:t>
-            </a:r>
-          </a:p>
-          <a:p>
-            <a:pPr lvl="1"/>
-            <a:r>
-              <a:rPr lang="en-US" dirty="0"/>
-              <a:t>Sometimes lead to full-time positions after you graduate</a:t>
-            </a:r>
-          </a:p>
-          <a:p>
-            <a:r>
-              <a:rPr lang="en-US" dirty="0"/>
-              <a:t>In CS, you should be taking paid internships</a:t>
-            </a:r>
-          </a:p>
-          <a:p>
-            <a:pPr lvl="1"/>
-            <a:r>
-              <a:rPr lang="en-US" dirty="0"/>
-              <a:t>MA state law requires interns to be paid</a:t>
-            </a:r>
-          </a:p>
-          <a:p>
-            <a:r>
-              <a:rPr lang="en-US" dirty="0"/>
-              <a:t>Easiest to acquire after Junior year</a:t>
-            </a:r>
-          </a:p>
-          <a:p>
-            <a:pPr lvl="1"/>
-            <a:r>
-              <a:rPr lang="en-US" dirty="0"/>
-              <a:t>Have more experience</a:t>
-            </a:r>
-          </a:p>
-          <a:p>
-            <a:pPr lvl="1"/>
-            <a:r>
-              <a:rPr lang="en-US" dirty="0"/>
-              <a:t>Post-sophomore is still pretty common</a:t>
-            </a:r>
-          </a:p>
-          <a:p>
-            <a:pPr lvl="1"/>
-            <a:r>
-              <a:rPr lang="en-US" dirty="0"/>
-              <a:t>Might have difficulty before taking Computing 3</a:t>
-            </a:r>
-          </a:p>
-        </p:txBody>
-      </p:sp>
-      <p:sp>
-        <p:nvSpPr>
-          <p:cNvPr id="4" name="Slide Number Placeholder 3">
-            <a:extLst>
-              <a:ext uri="{FF2B5EF4-FFF2-40B4-BE49-F238E27FC236}">
-                <a16:creationId xmlns:a16="http://schemas.microsoft.com/office/drawing/2014/main" id="{39726BBC-62E2-4B81-B247-097DBB889DDA}"/>
-              </a:ext>
-            </a:extLst>
-          </p:cNvPr>
-          <p:cNvSpPr>
-            <a:spLocks noGrp="1"/>
-          </p:cNvSpPr>
-          <p:nvPr>
-            <p:ph type="sldNum" sz="quarter" idx="12"/>
-          </p:nvPr>
-        </p:nvSpPr>
-        <p:spPr/>
-        <p:txBody>
-          <a:bodyPr/>
-          <a:lstStyle/>
-          <a:p>
-            <a:fld id="{0FA920F7-7227-4D6E-B7C6-AC05743CC8F3}" type="slidenum">
-              <a:rPr lang="en-US" smtClean="0"/>
-              <a:pPr/>
-              <a:t>5</a:t>
-            </a:fld>
-            <a:endParaRPr lang="en-US" dirty="0"/>
-          </a:p>
-        </p:txBody>
-      </p:sp>
-    </p:spTree>
-    <p:extLst>
-      <p:ext uri="{BB962C8B-B14F-4D97-AF65-F5344CB8AC3E}">
-        <p14:creationId xmlns:p14="http://schemas.microsoft.com/office/powerpoint/2010/main" val="1461098110"/>
-      </p:ext>
-    </p:extLst>
-  </p:cSld>
-  <p:clrMapOvr>
-    <a:masterClrMapping/>
-  </p:clrMapOvr>
-</p:sld>
-</file>
-
 <file path=ppt/slides/slide6.xml><?xml version="1.0" encoding="utf-8"?>
 <p:sld xmlns:a="http://schemas.openxmlformats.org/drawingml/2006/main" xmlns:r="http://schemas.openxmlformats.org/officeDocument/2006/relationships" xmlns:p="http://schemas.openxmlformats.org/presentationml/2006/main">
   <p:cSld>
@@ -5784,7 +5929,7 @@
           <p:cNvPr id="2" name="Title 1">
             <a:extLst>
               <a:ext uri="{FF2B5EF4-FFF2-40B4-BE49-F238E27FC236}">
-                <a16:creationId xmlns:a16="http://schemas.microsoft.com/office/drawing/2014/main" id="{D14C367E-6F78-42F0-A9B5-4B0C14DB23F5}"/>
+                <a16:creationId xmlns:a16="http://schemas.microsoft.com/office/drawing/2014/main" id="{E0DEFF18-690D-495A-9873-45141E4AFF75}"/>
               </a:ext>
             </a:extLst>
           </p:cNvPr>
@@ -5802,7 +5947,7 @@
           <a:p>
             <a:r>
               <a:rPr lang="en-US" dirty="0"/>
-              <a:t>Software Developer</a:t>
+              <a:t>Internship</a:t>
             </a:r>
           </a:p>
         </p:txBody>
@@ -5812,7 +5957,7 @@
           <p:cNvPr id="3" name="Text Placeholder 2">
             <a:extLst>
               <a:ext uri="{FF2B5EF4-FFF2-40B4-BE49-F238E27FC236}">
-                <a16:creationId xmlns:a16="http://schemas.microsoft.com/office/drawing/2014/main" id="{C1D5C3C6-2F04-4BBE-9478-156C29B0B289}"/>
+                <a16:creationId xmlns:a16="http://schemas.microsoft.com/office/drawing/2014/main" id="{C377CD3B-BF6D-48BD-89D9-7004166B1028}"/>
               </a:ext>
             </a:extLst>
           </p:cNvPr>
@@ -5830,45 +5975,69 @@
           <a:p>
             <a:r>
               <a:rPr lang="en-US" dirty="0"/>
-              <a:t>Work on writing software</a:t>
+              <a:t>Temporary job where you learn through real-world experience</a:t>
             </a:r>
           </a:p>
           <a:p>
             <a:pPr lvl="1"/>
             <a:r>
               <a:rPr lang="en-US" dirty="0"/>
-              <a:t>May be perpetual or finished-and-done depending on the project and the company</a:t>
-            </a:r>
-          </a:p>
-          <a:p>
-            <a:r>
-              <a:rPr lang="en-US" dirty="0"/>
-              <a:t>Important to find a project that interests you</a:t>
+              <a:t>Often for ~10-12 weeks over the summer</a:t>
             </a:r>
           </a:p>
           <a:p>
             <a:pPr lvl="1"/>
             <a:r>
               <a:rPr lang="en-US" dirty="0"/>
-              <a:t>Research both the company and the products they make</a:t>
+              <a:t>Sometimes have internships during the school year</a:t>
             </a:r>
           </a:p>
           <a:p>
             <a:pPr lvl="1"/>
             <a:r>
               <a:rPr lang="en-US" dirty="0"/>
-              <a:t>Remember that some non-software companies will need some software developers too</a:t>
-            </a:r>
-          </a:p>
-          <a:p>
-            <a:pPr lvl="2"/>
-            <a:r>
-              <a:rPr lang="en-US" dirty="0"/>
-              <a:t>Ex: Write controlling software for a car</a:t>
-            </a:r>
-          </a:p>
-          <a:p>
-            <a:endParaRPr lang="en-US" dirty="0"/>
+              <a:t>Sometimes lead to full-time positions after you graduate</a:t>
+            </a:r>
+          </a:p>
+          <a:p>
+            <a:r>
+              <a:rPr lang="en-US" dirty="0"/>
+              <a:t>In CS, you should be taking paid internships</a:t>
+            </a:r>
+          </a:p>
+          <a:p>
+            <a:pPr lvl="1"/>
+            <a:r>
+              <a:rPr lang="en-US" dirty="0"/>
+              <a:t>MA state law requires interns to be paid</a:t>
+            </a:r>
+          </a:p>
+          <a:p>
+            <a:r>
+              <a:rPr lang="en-US" dirty="0"/>
+              <a:t>Easiest to acquire after Junior year</a:t>
+            </a:r>
+          </a:p>
+          <a:p>
+            <a:pPr lvl="1"/>
+            <a:r>
+              <a:rPr lang="en-US" dirty="0"/>
+              <a:t>Have more experience</a:t>
+            </a:r>
+          </a:p>
+          <a:p>
+            <a:pPr lvl="1"/>
+            <a:r>
+              <a:rPr lang="en-US" dirty="0"/>
+              <a:t>Post-sophomore is still pretty common</a:t>
+            </a:r>
+          </a:p>
+          <a:p>
+            <a:pPr lvl="1"/>
+            <a:r>
+              <a:rPr lang="en-US" dirty="0"/>
+              <a:t>Might have difficulty before taking Computing 3</a:t>
+            </a:r>
           </a:p>
         </p:txBody>
       </p:sp>
@@ -5877,7 +6046,7 @@
           <p:cNvPr id="4" name="Slide Number Placeholder 3">
             <a:extLst>
               <a:ext uri="{FF2B5EF4-FFF2-40B4-BE49-F238E27FC236}">
-                <a16:creationId xmlns:a16="http://schemas.microsoft.com/office/drawing/2014/main" id="{8FC00297-79DD-4746-B233-962824E1749C}"/>
+                <a16:creationId xmlns:a16="http://schemas.microsoft.com/office/drawing/2014/main" id="{39726BBC-62E2-4B81-B247-097DBB889DDA}"/>
               </a:ext>
             </a:extLst>
           </p:cNvPr>
@@ -5905,7 +6074,7 @@
     </p:spTree>
     <p:extLst>
       <p:ext uri="{BB962C8B-B14F-4D97-AF65-F5344CB8AC3E}">
-        <p14:creationId xmlns:p14="http://schemas.microsoft.com/office/powerpoint/2010/main" val="2066061587"/>
+        <p14:creationId xmlns:p14="http://schemas.microsoft.com/office/powerpoint/2010/main" val="1461098110"/>
       </p:ext>
     </p:extLst>
   </p:cSld>
@@ -5937,7 +6106,7 @@
           <p:cNvPr id="2" name="Title 1">
             <a:extLst>
               <a:ext uri="{FF2B5EF4-FFF2-40B4-BE49-F238E27FC236}">
-                <a16:creationId xmlns:a16="http://schemas.microsoft.com/office/drawing/2014/main" id="{68A53A6C-5854-482B-95D0-D63E3BA7A37F}"/>
+                <a16:creationId xmlns:a16="http://schemas.microsoft.com/office/drawing/2014/main" id="{D14C367E-6F78-42F0-A9B5-4B0C14DB23F5}"/>
               </a:ext>
             </a:extLst>
           </p:cNvPr>
@@ -5955,7 +6124,7 @@
           <a:p>
             <a:r>
               <a:rPr lang="en-US" dirty="0"/>
-              <a:t>Cybersecurity Expert</a:t>
+              <a:t>Software Developer</a:t>
             </a:r>
           </a:p>
         </p:txBody>
@@ -5965,7 +6134,7 @@
           <p:cNvPr id="3" name="Text Placeholder 2">
             <a:extLst>
               <a:ext uri="{FF2B5EF4-FFF2-40B4-BE49-F238E27FC236}">
-                <a16:creationId xmlns:a16="http://schemas.microsoft.com/office/drawing/2014/main" id="{6DE6C60E-6F9E-494F-A0D9-4E098696D5CD}"/>
+                <a16:creationId xmlns:a16="http://schemas.microsoft.com/office/drawing/2014/main" id="{C1D5C3C6-2F04-4BBE-9478-156C29B0B289}"/>
               </a:ext>
             </a:extLst>
           </p:cNvPr>
@@ -5983,70 +6152,45 @@
           <a:p>
             <a:r>
               <a:rPr lang="en-US" dirty="0"/>
-              <a:t>Help protect systems from attacks by malicious actors</a:t>
+              <a:t>Work on writing software</a:t>
             </a:r>
           </a:p>
           <a:p>
             <a:pPr lvl="1"/>
             <a:r>
               <a:rPr lang="en-US" dirty="0"/>
-              <a:t>Intrusion / Snooping</a:t>
+              <a:t>May be perpetual or finished-and-done depending on the project and the company</a:t>
+            </a:r>
+          </a:p>
+          <a:p>
+            <a:r>
+              <a:rPr lang="en-US" dirty="0"/>
+              <a:t>Important to find a project that interests you</a:t>
             </a:r>
           </a:p>
           <a:p>
             <a:pPr lvl="1"/>
             <a:r>
               <a:rPr lang="en-US" dirty="0"/>
-              <a:t>Denial of Service</a:t>
+              <a:t>Research both the company and the products they make</a:t>
             </a:r>
           </a:p>
           <a:p>
             <a:pPr lvl="1"/>
             <a:r>
               <a:rPr lang="en-US" dirty="0"/>
-              <a:t>Phishing</a:t>
-            </a:r>
-          </a:p>
-          <a:p>
-            <a:pPr lvl="1"/>
-            <a:r>
-              <a:rPr lang="en-US" dirty="0"/>
-              <a:t>Application Vulnerabilities</a:t>
-            </a:r>
-          </a:p>
-          <a:p>
-            <a:r>
-              <a:rPr lang="en-US" dirty="0"/>
-              <a:t>Courses you should take</a:t>
-            </a:r>
-          </a:p>
-          <a:p>
-            <a:pPr lvl="1"/>
-            <a:r>
-              <a:rPr lang="en-US" dirty="0"/>
-              <a:t>Data Communications (COMP 4130)</a:t>
-            </a:r>
-          </a:p>
-          <a:p>
-            <a:pPr lvl="1"/>
-            <a:r>
-              <a:rPr lang="en-US" dirty="0"/>
-              <a:t>Cyber Crime Investigation (COMP 4611)</a:t>
-            </a:r>
-          </a:p>
-          <a:p>
-            <a:pPr lvl="1"/>
-            <a:r>
-              <a:rPr lang="en-US" dirty="0"/>
-              <a:t>Maybe some Legal Studies courses (LGST)</a:t>
-            </a:r>
-          </a:p>
-          <a:p>
-            <a:pPr lvl="1"/>
-            <a:r>
-              <a:rPr lang="en-US" dirty="0"/>
-              <a:t>There is now a Cybersecurity option (not yet posted)</a:t>
-            </a:r>
+              <a:t>Remember that some non-software companies will need some software developers too</a:t>
+            </a:r>
+          </a:p>
+          <a:p>
+            <a:pPr lvl="2"/>
+            <a:r>
+              <a:rPr lang="en-US" dirty="0"/>
+              <a:t>Ex: Write controlling software for a car</a:t>
+            </a:r>
+          </a:p>
+          <a:p>
+            <a:endParaRPr lang="en-US" dirty="0"/>
           </a:p>
         </p:txBody>
       </p:sp>
@@ -6055,7 +6199,7 @@
           <p:cNvPr id="4" name="Slide Number Placeholder 3">
             <a:extLst>
               <a:ext uri="{FF2B5EF4-FFF2-40B4-BE49-F238E27FC236}">
-                <a16:creationId xmlns:a16="http://schemas.microsoft.com/office/drawing/2014/main" id="{3135C4F1-737D-4416-ACEA-A45D1FF31063}"/>
+                <a16:creationId xmlns:a16="http://schemas.microsoft.com/office/drawing/2014/main" id="{8FC00297-79DD-4746-B233-962824E1749C}"/>
               </a:ext>
             </a:extLst>
           </p:cNvPr>
@@ -6083,7 +6227,7 @@
     </p:spTree>
     <p:extLst>
       <p:ext uri="{BB962C8B-B14F-4D97-AF65-F5344CB8AC3E}">
-        <p14:creationId xmlns:p14="http://schemas.microsoft.com/office/powerpoint/2010/main" val="1671858649"/>
+        <p14:creationId xmlns:p14="http://schemas.microsoft.com/office/powerpoint/2010/main" val="2066061587"/>
       </p:ext>
     </p:extLst>
   </p:cSld>
@@ -6115,7 +6259,7 @@
           <p:cNvPr id="2" name="Title 1">
             <a:extLst>
               <a:ext uri="{FF2B5EF4-FFF2-40B4-BE49-F238E27FC236}">
-                <a16:creationId xmlns:a16="http://schemas.microsoft.com/office/drawing/2014/main" id="{F2C41FE5-29E8-454B-868C-E9999DB746D1}"/>
+                <a16:creationId xmlns:a16="http://schemas.microsoft.com/office/drawing/2014/main" id="{68A53A6C-5854-482B-95D0-D63E3BA7A37F}"/>
               </a:ext>
             </a:extLst>
           </p:cNvPr>
@@ -6133,7 +6277,7 @@
           <a:p>
             <a:r>
               <a:rPr lang="en-US" dirty="0"/>
-              <a:t>UX Designer</a:t>
+              <a:t>Cybersecurity Expert</a:t>
             </a:r>
           </a:p>
         </p:txBody>
@@ -6143,7 +6287,7 @@
           <p:cNvPr id="3" name="Text Placeholder 2">
             <a:extLst>
               <a:ext uri="{FF2B5EF4-FFF2-40B4-BE49-F238E27FC236}">
-                <a16:creationId xmlns:a16="http://schemas.microsoft.com/office/drawing/2014/main" id="{CD646D86-F8D5-4A9D-93C1-F4E3A90F46A4}"/>
+                <a16:creationId xmlns:a16="http://schemas.microsoft.com/office/drawing/2014/main" id="{6DE6C60E-6F9E-494F-A0D9-4E098696D5CD}"/>
               </a:ext>
             </a:extLst>
           </p:cNvPr>
@@ -6161,34 +6305,35 @@
           <a:p>
             <a:r>
               <a:rPr lang="en-US" dirty="0"/>
-              <a:t>Design how a system looks</a:t>
+              <a:t>Help protect systems from attacks by malicious actors</a:t>
             </a:r>
           </a:p>
           <a:p>
             <a:pPr lvl="1"/>
             <a:r>
               <a:rPr lang="en-US" dirty="0"/>
-              <a:t>Involves some artistic creativity</a:t>
-            </a:r>
-          </a:p>
-          <a:p>
-            <a:r>
-              <a:rPr lang="en-US" dirty="0"/>
-              <a:t>May also design other interface parts to make life better</a:t>
+              <a:t>Intrusion / Snooping</a:t>
             </a:r>
           </a:p>
           <a:p>
             <a:pPr lvl="1"/>
             <a:r>
               <a:rPr lang="en-US" dirty="0"/>
-              <a:t>Color choices</a:t>
+              <a:t>Denial of Service</a:t>
             </a:r>
           </a:p>
           <a:p>
             <a:pPr lvl="1"/>
             <a:r>
               <a:rPr lang="en-US" dirty="0"/>
-              <a:t>Sounds</a:t>
+              <a:t>Phishing</a:t>
+            </a:r>
+          </a:p>
+          <a:p>
+            <a:pPr lvl="1"/>
+            <a:r>
+              <a:rPr lang="en-US" dirty="0"/>
+              <a:t>Application Vulnerabilities</a:t>
             </a:r>
           </a:p>
           <a:p>
@@ -6201,28 +6346,28 @@
             <a:pPr lvl="1"/>
             <a:r>
               <a:rPr lang="en-US" dirty="0"/>
-              <a:t>GUI Programming</a:t>
+              <a:t>Data Communications (COMP 4130)</a:t>
             </a:r>
           </a:p>
           <a:p>
             <a:pPr lvl="1"/>
             <a:r>
               <a:rPr lang="en-US" dirty="0"/>
-              <a:t>Mobile App Programming</a:t>
+              <a:t>Cyber Crime Investigation (COMP 4611)</a:t>
             </a:r>
           </a:p>
           <a:p>
             <a:pPr lvl="1"/>
             <a:r>
               <a:rPr lang="en-US" dirty="0"/>
-              <a:t>Art classes (maybe even an Art major / minor)</a:t>
-            </a:r>
-          </a:p>
-          <a:p>
-            <a:pPr lvl="2"/>
-            <a:r>
-              <a:rPr lang="en-US" dirty="0"/>
-              <a:t>Especially graphic design</a:t>
+              <a:t>Maybe some Legal Studies courses (LGST) or Criminology (CRIM)</a:t>
+            </a:r>
+          </a:p>
+          <a:p>
+            <a:pPr lvl="1"/>
+            <a:r>
+              <a:rPr lang="en-US" dirty="0"/>
+              <a:t>There is now a Cybersecurity option (not yet posted)</a:t>
             </a:r>
           </a:p>
         </p:txBody>
@@ -6232,7 +6377,7 @@
           <p:cNvPr id="4" name="Slide Number Placeholder 3">
             <a:extLst>
               <a:ext uri="{FF2B5EF4-FFF2-40B4-BE49-F238E27FC236}">
-                <a16:creationId xmlns:a16="http://schemas.microsoft.com/office/drawing/2014/main" id="{3971BAC2-8DFC-4F33-81BD-567E8606647F}"/>
+                <a16:creationId xmlns:a16="http://schemas.microsoft.com/office/drawing/2014/main" id="{3135C4F1-737D-4416-ACEA-A45D1FF31063}"/>
               </a:ext>
             </a:extLst>
           </p:cNvPr>
@@ -6260,7 +6405,7 @@
     </p:spTree>
     <p:extLst>
       <p:ext uri="{BB962C8B-B14F-4D97-AF65-F5344CB8AC3E}">
-        <p14:creationId xmlns:p14="http://schemas.microsoft.com/office/powerpoint/2010/main" val="1093005607"/>
+        <p14:creationId xmlns:p14="http://schemas.microsoft.com/office/powerpoint/2010/main" val="1671858649"/>
       </p:ext>
     </p:extLst>
   </p:cSld>
@@ -6292,7 +6437,7 @@
           <p:cNvPr id="2" name="Title 1">
             <a:extLst>
               <a:ext uri="{FF2B5EF4-FFF2-40B4-BE49-F238E27FC236}">
-                <a16:creationId xmlns:a16="http://schemas.microsoft.com/office/drawing/2014/main" id="{B3FA069B-AE7F-46E3-BEED-936DCD49D8F3}"/>
+                <a16:creationId xmlns:a16="http://schemas.microsoft.com/office/drawing/2014/main" id="{F2C41FE5-29E8-454B-868C-E9999DB746D1}"/>
               </a:ext>
             </a:extLst>
           </p:cNvPr>
@@ -6310,7 +6455,7 @@
           <a:p>
             <a:r>
               <a:rPr lang="en-US" dirty="0"/>
-              <a:t>Data Scientist</a:t>
+              <a:t>UX Designer</a:t>
             </a:r>
           </a:p>
         </p:txBody>
@@ -6320,7 +6465,7 @@
           <p:cNvPr id="3" name="Text Placeholder 2">
             <a:extLst>
               <a:ext uri="{FF2B5EF4-FFF2-40B4-BE49-F238E27FC236}">
-                <a16:creationId xmlns:a16="http://schemas.microsoft.com/office/drawing/2014/main" id="{63DCDD34-CD91-48D5-A20F-8D7866D48B7B}"/>
+                <a16:creationId xmlns:a16="http://schemas.microsoft.com/office/drawing/2014/main" id="{CD646D86-F8D5-4A9D-93C1-F4E3A90F46A4}"/>
               </a:ext>
             </a:extLst>
           </p:cNvPr>
@@ -6338,21 +6483,34 @@
           <a:p>
             <a:r>
               <a:rPr lang="en-US" dirty="0"/>
-              <a:t>Responsible for managing and analyzing data</a:t>
+              <a:t>Design how a system looks</a:t>
             </a:r>
           </a:p>
           <a:p>
             <a:pPr lvl="1"/>
             <a:r>
               <a:rPr lang="en-US" dirty="0"/>
-              <a:t>Often given data from others, but may also collect it themselves</a:t>
+              <a:t>Involves some artistic creativity</a:t>
+            </a:r>
+          </a:p>
+          <a:p>
+            <a:r>
+              <a:rPr lang="en-US" dirty="0"/>
+              <a:t>May also design other interface parts to make life better</a:t>
             </a:r>
           </a:p>
           <a:p>
             <a:pPr lvl="1"/>
             <a:r>
               <a:rPr lang="en-US" dirty="0"/>
-              <a:t>Take the data and learn something useful from it</a:t>
+              <a:t>Color choices</a:t>
+            </a:r>
+          </a:p>
+          <a:p>
+            <a:pPr lvl="1"/>
+            <a:r>
+              <a:rPr lang="en-US" dirty="0"/>
+              <a:t>Sounds</a:t>
             </a:r>
           </a:p>
           <a:p>
@@ -6365,42 +6523,28 @@
             <a:pPr lvl="1"/>
             <a:r>
               <a:rPr lang="en-US" dirty="0"/>
-              <a:t>Data Mining (COMP 4210)</a:t>
+              <a:t>GUI Programming</a:t>
             </a:r>
           </a:p>
           <a:p>
             <a:pPr lvl="1"/>
             <a:r>
               <a:rPr lang="en-US" dirty="0"/>
-              <a:t>Machine Learning (COMP 4220)</a:t>
+              <a:t>Mobile App Programming</a:t>
             </a:r>
           </a:p>
           <a:p>
             <a:pPr lvl="1"/>
             <a:r>
               <a:rPr lang="en-US" dirty="0"/>
-              <a:t>Database (COMP 3090)</a:t>
-            </a:r>
-          </a:p>
-          <a:p>
-            <a:pPr lvl="1"/>
-            <a:r>
-              <a:rPr lang="en-US" dirty="0"/>
-              <a:t>Bioinformatics for CS (COMP 4290)</a:t>
-            </a:r>
-          </a:p>
-          <a:p>
-            <a:pPr lvl="1"/>
-            <a:r>
-              <a:rPr lang="en-US" dirty="0"/>
-              <a:t>More statistics</a:t>
-            </a:r>
-          </a:p>
-          <a:p>
-            <a:pPr lvl="1"/>
-            <a:r>
-              <a:rPr lang="en-US" dirty="0"/>
-              <a:t>Good idea to pair with another science</a:t>
+              <a:t>Art classes (maybe even an Art major / minor)</a:t>
+            </a:r>
+          </a:p>
+          <a:p>
+            <a:pPr lvl="2"/>
+            <a:r>
+              <a:rPr lang="en-US" dirty="0"/>
+              <a:t>Especially graphic design</a:t>
             </a:r>
           </a:p>
         </p:txBody>
@@ -6410,7 +6554,7 @@
           <p:cNvPr id="4" name="Slide Number Placeholder 3">
             <a:extLst>
               <a:ext uri="{FF2B5EF4-FFF2-40B4-BE49-F238E27FC236}">
-                <a16:creationId xmlns:a16="http://schemas.microsoft.com/office/drawing/2014/main" id="{80D3A6D5-BCD4-4BA2-8753-0CD809CC20E1}"/>
+                <a16:creationId xmlns:a16="http://schemas.microsoft.com/office/drawing/2014/main" id="{3971BAC2-8DFC-4F33-81BD-567E8606647F}"/>
               </a:ext>
             </a:extLst>
           </p:cNvPr>
@@ -6438,7 +6582,7 @@
     </p:spTree>
     <p:extLst>
       <p:ext uri="{BB962C8B-B14F-4D97-AF65-F5344CB8AC3E}">
-        <p14:creationId xmlns:p14="http://schemas.microsoft.com/office/powerpoint/2010/main" val="3473724036"/>
+        <p14:creationId xmlns:p14="http://schemas.microsoft.com/office/powerpoint/2010/main" val="1093005607"/>
       </p:ext>
     </p:extLst>
   </p:cSld>

</xml_diff>